<commit_message>
added comment about asset id
on the slide about what approach to use
</commit_message>
<xml_diff>
--- a/Risky NIST ecommerce.pptx
+++ b/Risky NIST ecommerce.pptx
@@ -15849,7 +15849,25 @@
             </a:r>
             <a:r>
               <a:rPr lang="en-US" dirty="0" smtClean="0"/>
-              <a:t>or
+              <a:t>or</a:t>
+            </a:r>
+          </a:p>
+          <a:p>
+            <a:r>
+              <a:rPr lang="en-US" dirty="0" smtClean="0"/>
+              <a:t> - this can also have the beneficial effect of requiring</a:t>
+            </a:r>
+            <a:r>
+              <a:rPr lang="en-US" baseline="0" dirty="0" smtClean="0"/>
+              <a:t> you to identify your </a:t>
+            </a:r>
+            <a:r>
+              <a:rPr lang="en-US" baseline="0" smtClean="0"/>
+              <a:t>valuable assets</a:t>
+            </a:r>
+            <a:r>
+              <a:rPr lang="en-US" dirty="0" smtClean="0"/>
+              <a:t>
 vulnerability oriented (the risk that identified vulnerabilities</a:t>
             </a:r>
             <a:r>

</xml_diff>